<commit_message>
Cambios en el motor, hice un replace brutal de riesgo no retorno por nivelRetorno pq asi estaba en latabla original
</commit_message>
<xml_diff>
--- a/Documentacion/diagramas bcredito v4.pptx
+++ b/Documentacion/diagramas bcredito v4.pptx
@@ -3942,7 +3942,7 @@
                 </a:solidFill>
                 <a:latin typeface="Montserrat" panose="00000500000000000000" pitchFamily="2" charset="0"/>
               </a:rPr>
-              <a:t>Respaldo Financiera</a:t>
+              <a:t>Nivel Respaldo Financiero</a:t>
             </a:r>
             <a:endParaRPr lang="es-ES" sz="1400" b="1" dirty="0">
               <a:solidFill>
@@ -4333,7 +4333,7 @@
                 </a:solidFill>
                 <a:latin typeface="Montserrat" panose="00000500000000000000" pitchFamily="2" charset="0"/>
               </a:rPr>
-              <a:t>Nivel de utilidades</a:t>
+              <a:t>Nivel de utilidad</a:t>
             </a:r>
             <a:endParaRPr lang="es-ES" sz="1400" b="1" dirty="0">
               <a:solidFill>
@@ -4900,7 +4900,7 @@
                 </a:solidFill>
                 <a:latin typeface="Montserrat" panose="00000500000000000000" pitchFamily="2" charset="0"/>
               </a:rPr>
-              <a:t>Utilidad</a:t>
+              <a:t>Utilidad Neta</a:t>
             </a:r>
             <a:endParaRPr lang="es-ES" sz="1400" b="1" dirty="0">
               <a:solidFill>
@@ -5406,8 +5406,8 @@
         </p:nvSpPr>
         <p:spPr>
           <a:xfrm>
-            <a:off x="3634409" y="3259841"/>
-            <a:ext cx="1285500" cy="600164"/>
+            <a:off x="3634408" y="3259841"/>
+            <a:ext cx="1441079" cy="600164"/>
           </a:xfrm>
           <a:prstGeom prst="roundRect">
             <a:avLst/>
@@ -5450,7 +5450,7 @@
                 </a:solidFill>
                 <a:latin typeface="Montserrat" panose="00000500000000000000" pitchFamily="2" charset="0"/>
               </a:rPr>
-              <a:t>Riesgo por edad</a:t>
+              <a:t>Calificación por edad</a:t>
             </a:r>
           </a:p>
         </p:txBody>
@@ -5471,8 +5471,8 @@
         </p:nvCxnSpPr>
         <p:spPr>
           <a:xfrm>
-            <a:off x="4913883" y="3396823"/>
-            <a:ext cx="1338550" cy="0"/>
+            <a:off x="5090355" y="3396823"/>
+            <a:ext cx="1162078" cy="1"/>
           </a:xfrm>
           <a:prstGeom prst="straightConnector1">
             <a:avLst/>
@@ -5513,7 +5513,7 @@
         </p:nvSpPr>
         <p:spPr>
           <a:xfrm>
-            <a:off x="4874806" y="3446466"/>
+            <a:off x="5075487" y="3471438"/>
             <a:ext cx="1441079" cy="400110"/>
           </a:xfrm>
           <a:prstGeom prst="rect">
@@ -5772,7 +5772,7 @@
                 </a:solidFill>
                 <a:latin typeface="Montserrat" panose="00000500000000000000" pitchFamily="2" charset="0"/>
               </a:rPr>
-              <a:t>Tasa probable de retorno</a:t>
+              <a:t>Nivel de retorno</a:t>
             </a:r>
           </a:p>
         </p:txBody>
@@ -5956,8 +5956,8 @@
         </p:nvCxnSpPr>
         <p:spPr>
           <a:xfrm>
-            <a:off x="1842961" y="4260776"/>
-            <a:ext cx="1250264" cy="0"/>
+            <a:off x="2300288" y="4260776"/>
+            <a:ext cx="792937" cy="0"/>
           </a:xfrm>
           <a:prstGeom prst="straightConnector1">
             <a:avLst/>
@@ -5998,7 +5998,7 @@
         </p:nvSpPr>
         <p:spPr>
           <a:xfrm>
-            <a:off x="785756" y="4133568"/>
+            <a:off x="16448" y="4078099"/>
             <a:ext cx="1055965" cy="486582"/>
           </a:xfrm>
           <a:prstGeom prst="roundRect">
@@ -6169,7 +6169,7 @@
         </p:nvSpPr>
         <p:spPr>
           <a:xfrm>
-            <a:off x="1850834" y="4321390"/>
+            <a:off x="2219014" y="4278094"/>
             <a:ext cx="1164968" cy="553998"/>
           </a:xfrm>
           <a:prstGeom prst="rect">
@@ -6253,7 +6253,7 @@
                 </a:solidFill>
                 <a:latin typeface="Montserrat" panose="00000500000000000000" pitchFamily="2" charset="0"/>
               </a:rPr>
-              <a:t>0&lt; FR &lt; 50000</a:t>
+              <a:t>0&lt; PT &lt; 50000</a:t>
             </a:r>
             <a:endParaRPr lang="es-PE" sz="1000" dirty="0"/>
           </a:p>
@@ -6265,7 +6265,7 @@
                 </a:solidFill>
                 <a:latin typeface="Montserrat" panose="00000500000000000000" pitchFamily="2" charset="0"/>
               </a:rPr>
-              <a:t>50000≤FR&lt;100000</a:t>
+              <a:t>50000≤PT&lt;100000</a:t>
             </a:r>
             <a:endParaRPr lang="es-PE" sz="1000" dirty="0"/>
           </a:p>
@@ -6277,7 +6277,7 @@
                 </a:solidFill>
                 <a:latin typeface="Montserrat" panose="00000500000000000000" pitchFamily="2" charset="0"/>
               </a:rPr>
-              <a:t>FR ≥ 100000</a:t>
+              <a:t>PT ≥ 100000</a:t>
             </a:r>
             <a:endParaRPr lang="es-PE" sz="1000" dirty="0"/>
           </a:p>
@@ -6329,10 +6329,10 @@
       </p:cxnSp>
       <p:sp>
         <p:nvSpPr>
-          <p:cNvPr id="63" name="Rectángulo: esquinas redondeadas 62">
-            <a:extLst>
-              <a:ext uri="{FF2B5EF4-FFF2-40B4-BE49-F238E27FC236}">
-                <a16:creationId xmlns:a16="http://schemas.microsoft.com/office/drawing/2014/main" id="{D44E7504-69D0-432E-8D4F-8DE3A8718591}"/>
+          <p:cNvPr id="65" name="Triángulo isósceles 64">
+            <a:extLst>
+              <a:ext uri="{FF2B5EF4-FFF2-40B4-BE49-F238E27FC236}">
+                <a16:creationId xmlns:a16="http://schemas.microsoft.com/office/drawing/2014/main" id="{644D139C-5C4F-4DF2-88A6-31EE215B5C30}"/>
               </a:ext>
             </a:extLst>
           </p:cNvPr>
@@ -6340,8 +6340,388 @@
           <p:nvPr/>
         </p:nvSpPr>
         <p:spPr>
-          <a:xfrm>
-            <a:off x="3533343" y="5343867"/>
+          <a:xfrm rot="5400000">
+            <a:off x="2568886" y="5391175"/>
+            <a:ext cx="1426853" cy="472969"/>
+          </a:xfrm>
+          <a:prstGeom prst="triangle">
+            <a:avLst>
+              <a:gd name="adj" fmla="val 49964"/>
+            </a:avLst>
+          </a:prstGeom>
+          <a:solidFill>
+            <a:schemeClr val="accent1">
+              <a:lumMod val="50000"/>
+            </a:schemeClr>
+          </a:solidFill>
+          <a:ln>
+            <a:noFill/>
+          </a:ln>
+        </p:spPr>
+        <p:style>
+          <a:lnRef idx="2">
+            <a:schemeClr val="accent1">
+              <a:shade val="50000"/>
+            </a:schemeClr>
+          </a:lnRef>
+          <a:fillRef idx="1">
+            <a:schemeClr val="accent1"/>
+          </a:fillRef>
+          <a:effectRef idx="0">
+            <a:schemeClr val="accent1"/>
+          </a:effectRef>
+          <a:fontRef idx="minor">
+            <a:schemeClr val="lt1"/>
+          </a:fontRef>
+        </p:style>
+        <p:txBody>
+          <a:bodyPr rtlCol="0" anchor="ctr"/>
+          <a:lstStyle/>
+          <a:p>
+            <a:pPr algn="ctr"/>
+            <a:endParaRPr lang="es-PE" sz="1600" dirty="0">
+              <a:latin typeface="Montserrat" panose="00000500000000000000" pitchFamily="2" charset="0"/>
+            </a:endParaRPr>
+          </a:p>
+        </p:txBody>
+      </p:sp>
+      <p:sp>
+        <p:nvSpPr>
+          <p:cNvPr id="66" name="Rectángulo: esquinas redondeadas 65">
+            <a:extLst>
+              <a:ext uri="{FF2B5EF4-FFF2-40B4-BE49-F238E27FC236}">
+                <a16:creationId xmlns:a16="http://schemas.microsoft.com/office/drawing/2014/main" id="{23D9F9F4-ACCA-47B1-86F8-C67FB76C66AF}"/>
+              </a:ext>
+            </a:extLst>
+          </p:cNvPr>
+          <p:cNvSpPr/>
+          <p:nvPr/>
+        </p:nvSpPr>
+        <p:spPr>
+          <a:xfrm>
+            <a:off x="1412015" y="4854058"/>
+            <a:ext cx="1250263" cy="486582"/>
+          </a:xfrm>
+          <a:prstGeom prst="roundRect">
+            <a:avLst/>
+          </a:prstGeom>
+          <a:solidFill>
+            <a:schemeClr val="accent1">
+              <a:lumMod val="20000"/>
+              <a:lumOff val="80000"/>
+            </a:schemeClr>
+          </a:solidFill>
+          <a:ln>
+            <a:noFill/>
+          </a:ln>
+        </p:spPr>
+        <p:style>
+          <a:lnRef idx="2">
+            <a:schemeClr val="accent1">
+              <a:shade val="50000"/>
+            </a:schemeClr>
+          </a:lnRef>
+          <a:fillRef idx="1">
+            <a:schemeClr val="accent1"/>
+          </a:fillRef>
+          <a:effectRef idx="0">
+            <a:schemeClr val="accent1"/>
+          </a:effectRef>
+          <a:fontRef idx="minor">
+            <a:schemeClr val="lt1"/>
+          </a:fontRef>
+        </p:style>
+        <p:txBody>
+          <a:bodyPr rtlCol="0" anchor="ctr"/>
+          <a:lstStyle/>
+          <a:p>
+            <a:pPr algn="ctr"/>
+            <a:r>
+              <a:rPr lang="es-ES" sz="1200" b="1" dirty="0">
+                <a:solidFill>
+                  <a:schemeClr val="tx1"/>
+                </a:solidFill>
+                <a:latin typeface="Montserrat" panose="00000500000000000000" pitchFamily="2" charset="0"/>
+              </a:rPr>
+              <a:t>Precio Inmuebles</a:t>
+            </a:r>
+          </a:p>
+        </p:txBody>
+      </p:sp>
+      <p:sp>
+        <p:nvSpPr>
+          <p:cNvPr id="67" name="Rectángulo: esquinas redondeadas 66">
+            <a:extLst>
+              <a:ext uri="{FF2B5EF4-FFF2-40B4-BE49-F238E27FC236}">
+                <a16:creationId xmlns:a16="http://schemas.microsoft.com/office/drawing/2014/main" id="{CFFB08AA-E085-497B-8EAF-07172A0393F8}"/>
+              </a:ext>
+            </a:extLst>
+          </p:cNvPr>
+          <p:cNvSpPr/>
+          <p:nvPr/>
+        </p:nvSpPr>
+        <p:spPr>
+          <a:xfrm>
+            <a:off x="1396311" y="5777436"/>
+            <a:ext cx="1249821" cy="486582"/>
+          </a:xfrm>
+          <a:prstGeom prst="roundRect">
+            <a:avLst/>
+          </a:prstGeom>
+          <a:solidFill>
+            <a:schemeClr val="accent1">
+              <a:lumMod val="20000"/>
+              <a:lumOff val="80000"/>
+            </a:schemeClr>
+          </a:solidFill>
+          <a:ln>
+            <a:noFill/>
+          </a:ln>
+        </p:spPr>
+        <p:style>
+          <a:lnRef idx="2">
+            <a:schemeClr val="accent1">
+              <a:shade val="50000"/>
+            </a:schemeClr>
+          </a:lnRef>
+          <a:fillRef idx="1">
+            <a:schemeClr val="accent1"/>
+          </a:fillRef>
+          <a:effectRef idx="0">
+            <a:schemeClr val="accent1"/>
+          </a:effectRef>
+          <a:fontRef idx="minor">
+            <a:schemeClr val="lt1"/>
+          </a:fontRef>
+        </p:style>
+        <p:txBody>
+          <a:bodyPr rtlCol="0" anchor="ctr"/>
+          <a:lstStyle/>
+          <a:p>
+            <a:pPr algn="ctr"/>
+            <a:r>
+              <a:rPr lang="es-ES" sz="1200" b="1" dirty="0">
+                <a:solidFill>
+                  <a:schemeClr val="tx1"/>
+                </a:solidFill>
+                <a:latin typeface="Montserrat" panose="00000500000000000000" pitchFamily="2" charset="0"/>
+              </a:rPr>
+              <a:t>Respaldo en Capital</a:t>
+            </a:r>
+          </a:p>
+        </p:txBody>
+      </p:sp>
+      <p:cxnSp>
+        <p:nvCxnSpPr>
+          <p:cNvPr id="68" name="Conector recto de flecha 67">
+            <a:extLst>
+              <a:ext uri="{FF2B5EF4-FFF2-40B4-BE49-F238E27FC236}">
+                <a16:creationId xmlns:a16="http://schemas.microsoft.com/office/drawing/2014/main" id="{15C7DBC7-CBDB-498A-87E9-227A5D99183C}"/>
+              </a:ext>
+            </a:extLst>
+          </p:cNvPr>
+          <p:cNvCxnSpPr>
+            <a:cxnSpLocks/>
+          </p:cNvCxnSpPr>
+          <p:nvPr/>
+        </p:nvCxnSpPr>
+        <p:spPr>
+          <a:xfrm>
+            <a:off x="2659632" y="5112376"/>
+            <a:ext cx="369122" cy="0"/>
+          </a:xfrm>
+          <a:prstGeom prst="straightConnector1">
+            <a:avLst/>
+          </a:prstGeom>
+          <a:ln w="57150">
+            <a:solidFill>
+              <a:schemeClr val="tx1"/>
+            </a:solidFill>
+            <a:tailEnd type="triangle"/>
+          </a:ln>
+        </p:spPr>
+        <p:style>
+          <a:lnRef idx="1">
+            <a:schemeClr val="accent1"/>
+          </a:lnRef>
+          <a:fillRef idx="0">
+            <a:schemeClr val="accent1"/>
+          </a:fillRef>
+          <a:effectRef idx="0">
+            <a:schemeClr val="accent1"/>
+          </a:effectRef>
+          <a:fontRef idx="minor">
+            <a:schemeClr val="tx1"/>
+          </a:fontRef>
+        </p:style>
+      </p:cxnSp>
+      <p:cxnSp>
+        <p:nvCxnSpPr>
+          <p:cNvPr id="69" name="Conector recto de flecha 68">
+            <a:extLst>
+              <a:ext uri="{FF2B5EF4-FFF2-40B4-BE49-F238E27FC236}">
+                <a16:creationId xmlns:a16="http://schemas.microsoft.com/office/drawing/2014/main" id="{260FB004-63CB-4653-B3EA-BFE496BD3101}"/>
+              </a:ext>
+            </a:extLst>
+          </p:cNvPr>
+          <p:cNvCxnSpPr>
+            <a:cxnSpLocks/>
+          </p:cNvCxnSpPr>
+          <p:nvPr/>
+        </p:nvCxnSpPr>
+        <p:spPr>
+          <a:xfrm>
+            <a:off x="2698850" y="6066736"/>
+            <a:ext cx="369122" cy="0"/>
+          </a:xfrm>
+          <a:prstGeom prst="straightConnector1">
+            <a:avLst/>
+          </a:prstGeom>
+          <a:ln w="57150">
+            <a:solidFill>
+              <a:schemeClr val="tx1"/>
+            </a:solidFill>
+            <a:tailEnd type="triangle"/>
+          </a:ln>
+        </p:spPr>
+        <p:style>
+          <a:lnRef idx="1">
+            <a:schemeClr val="accent1"/>
+          </a:lnRef>
+          <a:fillRef idx="0">
+            <a:schemeClr val="accent1"/>
+          </a:fillRef>
+          <a:effectRef idx="0">
+            <a:schemeClr val="accent1"/>
+          </a:effectRef>
+          <a:fontRef idx="minor">
+            <a:schemeClr val="tx1"/>
+          </a:fontRef>
+        </p:style>
+      </p:cxnSp>
+      <p:sp>
+        <p:nvSpPr>
+          <p:cNvPr id="62" name="Rectángulo: esquinas redondeadas 61">
+            <a:extLst>
+              <a:ext uri="{FF2B5EF4-FFF2-40B4-BE49-F238E27FC236}">
+                <a16:creationId xmlns:a16="http://schemas.microsoft.com/office/drawing/2014/main" id="{EBB77265-978D-4632-864E-854AA2212E8C}"/>
+              </a:ext>
+            </a:extLst>
+          </p:cNvPr>
+          <p:cNvSpPr/>
+          <p:nvPr/>
+        </p:nvSpPr>
+        <p:spPr>
+          <a:xfrm>
+            <a:off x="1213705" y="4078099"/>
+            <a:ext cx="1055965" cy="486582"/>
+          </a:xfrm>
+          <a:prstGeom prst="roundRect">
+            <a:avLst/>
+          </a:prstGeom>
+          <a:solidFill>
+            <a:schemeClr val="accent1">
+              <a:lumMod val="20000"/>
+              <a:lumOff val="80000"/>
+            </a:schemeClr>
+          </a:solidFill>
+          <a:ln>
+            <a:noFill/>
+          </a:ln>
+        </p:spPr>
+        <p:style>
+          <a:lnRef idx="2">
+            <a:schemeClr val="accent1">
+              <a:shade val="50000"/>
+            </a:schemeClr>
+          </a:lnRef>
+          <a:fillRef idx="1">
+            <a:schemeClr val="accent1"/>
+          </a:fillRef>
+          <a:effectRef idx="0">
+            <a:schemeClr val="accent1"/>
+          </a:effectRef>
+          <a:fontRef idx="minor">
+            <a:schemeClr val="lt1"/>
+          </a:fontRef>
+        </p:style>
+        <p:txBody>
+          <a:bodyPr rtlCol="0" anchor="ctr"/>
+          <a:lstStyle/>
+          <a:p>
+            <a:pPr algn="ctr"/>
+            <a:r>
+              <a:rPr lang="es-ES" sz="1200" b="1" dirty="0">
+                <a:solidFill>
+                  <a:schemeClr val="tx1"/>
+                </a:solidFill>
+                <a:latin typeface="Montserrat" panose="00000500000000000000" pitchFamily="2" charset="0"/>
+              </a:rPr>
+              <a:t>Tasa de Retorno</a:t>
+            </a:r>
+          </a:p>
+        </p:txBody>
+      </p:sp>
+      <p:cxnSp>
+        <p:nvCxnSpPr>
+          <p:cNvPr id="64" name="Conector recto de flecha 63">
+            <a:extLst>
+              <a:ext uri="{FF2B5EF4-FFF2-40B4-BE49-F238E27FC236}">
+                <a16:creationId xmlns:a16="http://schemas.microsoft.com/office/drawing/2014/main" id="{BA5147E0-B089-4DD0-B9D2-F7B249E86617}"/>
+              </a:ext>
+            </a:extLst>
+          </p:cNvPr>
+          <p:cNvCxnSpPr>
+            <a:cxnSpLocks/>
+            <a:endCxn id="62" idx="1"/>
+          </p:cNvCxnSpPr>
+          <p:nvPr/>
+        </p:nvCxnSpPr>
+        <p:spPr>
+          <a:xfrm>
+            <a:off x="961763" y="4321390"/>
+            <a:ext cx="251942" cy="0"/>
+          </a:xfrm>
+          <a:prstGeom prst="straightConnector1">
+            <a:avLst/>
+          </a:prstGeom>
+          <a:ln w="57150">
+            <a:solidFill>
+              <a:schemeClr val="tx1"/>
+            </a:solidFill>
+            <a:tailEnd type="triangle"/>
+          </a:ln>
+        </p:spPr>
+        <p:style>
+          <a:lnRef idx="1">
+            <a:schemeClr val="accent1"/>
+          </a:lnRef>
+          <a:fillRef idx="0">
+            <a:schemeClr val="accent1"/>
+          </a:fillRef>
+          <a:effectRef idx="0">
+            <a:schemeClr val="accent1"/>
+          </a:effectRef>
+          <a:fontRef idx="minor">
+            <a:schemeClr val="tx1"/>
+          </a:fontRef>
+        </p:style>
+      </p:cxnSp>
+      <p:sp>
+        <p:nvSpPr>
+          <p:cNvPr id="70" name="Rectángulo: esquinas redondeadas 69">
+            <a:extLst>
+              <a:ext uri="{FF2B5EF4-FFF2-40B4-BE49-F238E27FC236}">
+                <a16:creationId xmlns:a16="http://schemas.microsoft.com/office/drawing/2014/main" id="{D5B46E03-FD17-42C4-9FF9-AF7641A2A646}"/>
+              </a:ext>
+            </a:extLst>
+          </p:cNvPr>
+          <p:cNvSpPr/>
+          <p:nvPr/>
+        </p:nvSpPr>
+        <p:spPr>
+          <a:xfrm>
+            <a:off x="3483485" y="5282949"/>
             <a:ext cx="1384543" cy="600164"/>
           </a:xfrm>
           <a:prstGeom prst="roundRect">
@@ -6385,295 +6765,11 @@
                 </a:solidFill>
                 <a:latin typeface="Montserrat" panose="00000500000000000000" pitchFamily="2" charset="0"/>
               </a:rPr>
-              <a:t>Factor </a:t>
-            </a:r>
-          </a:p>
-          <a:p>
-            <a:pPr algn="ctr"/>
-            <a:r>
-              <a:rPr lang="es-PE" sz="1400" b="1" dirty="0">
-                <a:solidFill>
-                  <a:schemeClr val="tx1"/>
-                </a:solidFill>
-                <a:latin typeface="Montserrat" panose="00000500000000000000" pitchFamily="2" charset="0"/>
-              </a:rPr>
-              <a:t>Respaldo</a:t>
-            </a:r>
-          </a:p>
-        </p:txBody>
-      </p:sp>
-      <p:sp>
-        <p:nvSpPr>
-          <p:cNvPr id="65" name="Triángulo isósceles 64">
-            <a:extLst>
-              <a:ext uri="{FF2B5EF4-FFF2-40B4-BE49-F238E27FC236}">
-                <a16:creationId xmlns:a16="http://schemas.microsoft.com/office/drawing/2014/main" id="{644D139C-5C4F-4DF2-88A6-31EE215B5C30}"/>
-              </a:ext>
-            </a:extLst>
-          </p:cNvPr>
-          <p:cNvSpPr/>
-          <p:nvPr/>
-        </p:nvSpPr>
-        <p:spPr>
-          <a:xfrm rot="5400000">
-            <a:off x="2581431" y="5507477"/>
-            <a:ext cx="1426853" cy="472969"/>
-          </a:xfrm>
-          <a:prstGeom prst="triangle">
-            <a:avLst>
-              <a:gd name="adj" fmla="val 49964"/>
-            </a:avLst>
-          </a:prstGeom>
-          <a:solidFill>
-            <a:schemeClr val="accent1">
-              <a:lumMod val="50000"/>
-            </a:schemeClr>
-          </a:solidFill>
-          <a:ln>
-            <a:noFill/>
-          </a:ln>
-        </p:spPr>
-        <p:style>
-          <a:lnRef idx="2">
-            <a:schemeClr val="accent1">
-              <a:shade val="50000"/>
-            </a:schemeClr>
-          </a:lnRef>
-          <a:fillRef idx="1">
-            <a:schemeClr val="accent1"/>
-          </a:fillRef>
-          <a:effectRef idx="0">
-            <a:schemeClr val="accent1"/>
-          </a:effectRef>
-          <a:fontRef idx="minor">
-            <a:schemeClr val="lt1"/>
-          </a:fontRef>
-        </p:style>
-        <p:txBody>
-          <a:bodyPr rtlCol="0" anchor="ctr"/>
-          <a:lstStyle/>
-          <a:p>
-            <a:pPr algn="ctr"/>
-            <a:endParaRPr lang="es-PE" sz="1600" dirty="0">
-              <a:latin typeface="Montserrat" panose="00000500000000000000" pitchFamily="2" charset="0"/>
-            </a:endParaRPr>
-          </a:p>
-        </p:txBody>
-      </p:sp>
-      <p:sp>
-        <p:nvSpPr>
-          <p:cNvPr id="66" name="Rectángulo: esquinas redondeadas 65">
-            <a:extLst>
-              <a:ext uri="{FF2B5EF4-FFF2-40B4-BE49-F238E27FC236}">
-                <a16:creationId xmlns:a16="http://schemas.microsoft.com/office/drawing/2014/main" id="{23D9F9F4-ACCA-47B1-86F8-C67FB76C66AF}"/>
-              </a:ext>
-            </a:extLst>
-          </p:cNvPr>
-          <p:cNvSpPr/>
-          <p:nvPr/>
-        </p:nvSpPr>
-        <p:spPr>
-          <a:xfrm>
-            <a:off x="1424560" y="4970360"/>
-            <a:ext cx="1250263" cy="486582"/>
-          </a:xfrm>
-          <a:prstGeom prst="roundRect">
-            <a:avLst/>
-          </a:prstGeom>
-          <a:solidFill>
-            <a:schemeClr val="accent1">
-              <a:lumMod val="20000"/>
-              <a:lumOff val="80000"/>
-            </a:schemeClr>
-          </a:solidFill>
-          <a:ln>
-            <a:noFill/>
-          </a:ln>
-        </p:spPr>
-        <p:style>
-          <a:lnRef idx="2">
-            <a:schemeClr val="accent1">
-              <a:shade val="50000"/>
-            </a:schemeClr>
-          </a:lnRef>
-          <a:fillRef idx="1">
-            <a:schemeClr val="accent1"/>
-          </a:fillRef>
-          <a:effectRef idx="0">
-            <a:schemeClr val="accent1"/>
-          </a:effectRef>
-          <a:fontRef idx="minor">
-            <a:schemeClr val="lt1"/>
-          </a:fontRef>
-        </p:style>
-        <p:txBody>
-          <a:bodyPr rtlCol="0" anchor="ctr"/>
-          <a:lstStyle/>
-          <a:p>
-            <a:pPr algn="ctr"/>
-            <a:r>
-              <a:rPr lang="es-ES" sz="1200" b="1" dirty="0">
-                <a:solidFill>
-                  <a:schemeClr val="tx1"/>
-                </a:solidFill>
-                <a:latin typeface="Montserrat" panose="00000500000000000000" pitchFamily="2" charset="0"/>
-              </a:rPr>
-              <a:t>Inmueble</a:t>
-            </a:r>
-          </a:p>
-        </p:txBody>
-      </p:sp>
-      <p:sp>
-        <p:nvSpPr>
-          <p:cNvPr id="67" name="Rectángulo: esquinas redondeadas 66">
-            <a:extLst>
-              <a:ext uri="{FF2B5EF4-FFF2-40B4-BE49-F238E27FC236}">
-                <a16:creationId xmlns:a16="http://schemas.microsoft.com/office/drawing/2014/main" id="{CFFB08AA-E085-497B-8EAF-07172A0393F8}"/>
-              </a:ext>
-            </a:extLst>
-          </p:cNvPr>
-          <p:cNvSpPr/>
-          <p:nvPr/>
-        </p:nvSpPr>
-        <p:spPr>
-          <a:xfrm>
-            <a:off x="1408856" y="5893738"/>
-            <a:ext cx="1249821" cy="486582"/>
-          </a:xfrm>
-          <a:prstGeom prst="roundRect">
-            <a:avLst/>
-          </a:prstGeom>
-          <a:solidFill>
-            <a:schemeClr val="accent1">
-              <a:lumMod val="20000"/>
-              <a:lumOff val="80000"/>
-            </a:schemeClr>
-          </a:solidFill>
-          <a:ln>
-            <a:noFill/>
-          </a:ln>
-        </p:spPr>
-        <p:style>
-          <a:lnRef idx="2">
-            <a:schemeClr val="accent1">
-              <a:shade val="50000"/>
-            </a:schemeClr>
-          </a:lnRef>
-          <a:fillRef idx="1">
-            <a:schemeClr val="accent1"/>
-          </a:fillRef>
-          <a:effectRef idx="0">
-            <a:schemeClr val="accent1"/>
-          </a:effectRef>
-          <a:fontRef idx="minor">
-            <a:schemeClr val="lt1"/>
-          </a:fontRef>
-        </p:style>
-        <p:txBody>
-          <a:bodyPr rtlCol="0" anchor="ctr"/>
-          <a:lstStyle/>
-          <a:p>
-            <a:pPr algn="ctr"/>
-            <a:r>
-              <a:rPr lang="es-ES" sz="1200" b="1" dirty="0">
-                <a:solidFill>
-                  <a:schemeClr val="tx1"/>
-                </a:solidFill>
-                <a:latin typeface="Montserrat" panose="00000500000000000000" pitchFamily="2" charset="0"/>
-              </a:rPr>
-              <a:t>Capital</a:t>
-            </a:r>
-          </a:p>
-        </p:txBody>
-      </p:sp>
-      <p:cxnSp>
-        <p:nvCxnSpPr>
-          <p:cNvPr id="68" name="Conector recto de flecha 67">
-            <a:extLst>
-              <a:ext uri="{FF2B5EF4-FFF2-40B4-BE49-F238E27FC236}">
-                <a16:creationId xmlns:a16="http://schemas.microsoft.com/office/drawing/2014/main" id="{15C7DBC7-CBDB-498A-87E9-227A5D99183C}"/>
-              </a:ext>
-            </a:extLst>
-          </p:cNvPr>
-          <p:cNvCxnSpPr>
-            <a:cxnSpLocks/>
-          </p:cNvCxnSpPr>
-          <p:nvPr/>
-        </p:nvCxnSpPr>
-        <p:spPr>
-          <a:xfrm>
-            <a:off x="2672177" y="5228678"/>
-            <a:ext cx="369122" cy="0"/>
-          </a:xfrm>
-          <a:prstGeom prst="straightConnector1">
-            <a:avLst/>
-          </a:prstGeom>
-          <a:ln w="57150">
-            <a:solidFill>
-              <a:schemeClr val="tx1"/>
-            </a:solidFill>
-            <a:tailEnd type="triangle"/>
-          </a:ln>
-        </p:spPr>
-        <p:style>
-          <a:lnRef idx="1">
-            <a:schemeClr val="accent1"/>
-          </a:lnRef>
-          <a:fillRef idx="0">
-            <a:schemeClr val="accent1"/>
-          </a:fillRef>
-          <a:effectRef idx="0">
-            <a:schemeClr val="accent1"/>
-          </a:effectRef>
-          <a:fontRef idx="minor">
-            <a:schemeClr val="tx1"/>
-          </a:fontRef>
-        </p:style>
-      </p:cxnSp>
-      <p:cxnSp>
-        <p:nvCxnSpPr>
-          <p:cNvPr id="69" name="Conector recto de flecha 68">
-            <a:extLst>
-              <a:ext uri="{FF2B5EF4-FFF2-40B4-BE49-F238E27FC236}">
-                <a16:creationId xmlns:a16="http://schemas.microsoft.com/office/drawing/2014/main" id="{260FB004-63CB-4653-B3EA-BFE496BD3101}"/>
-              </a:ext>
-            </a:extLst>
-          </p:cNvPr>
-          <p:cNvCxnSpPr>
-            <a:cxnSpLocks/>
-          </p:cNvCxnSpPr>
-          <p:nvPr/>
-        </p:nvCxnSpPr>
-        <p:spPr>
-          <a:xfrm>
-            <a:off x="2711395" y="6183038"/>
-            <a:ext cx="369122" cy="0"/>
-          </a:xfrm>
-          <a:prstGeom prst="straightConnector1">
-            <a:avLst/>
-          </a:prstGeom>
-          <a:ln w="57150">
-            <a:solidFill>
-              <a:schemeClr val="tx1"/>
-            </a:solidFill>
-            <a:tailEnd type="triangle"/>
-          </a:ln>
-        </p:spPr>
-        <p:style>
-          <a:lnRef idx="1">
-            <a:schemeClr val="accent1"/>
-          </a:lnRef>
-          <a:fillRef idx="0">
-            <a:schemeClr val="accent1"/>
-          </a:fillRef>
-          <a:effectRef idx="0">
-            <a:schemeClr val="accent1"/>
-          </a:effectRef>
-          <a:fontRef idx="minor">
-            <a:schemeClr val="tx1"/>
-          </a:fontRef>
-        </p:style>
-      </p:cxnSp>
+              <a:t>Patrimonio Total</a:t>
+            </a:r>
+          </a:p>
+        </p:txBody>
+      </p:sp>
     </p:spTree>
     <p:extLst>
       <p:ext uri="{BB962C8B-B14F-4D97-AF65-F5344CB8AC3E}">
@@ -7261,7 +7357,7 @@
                 </a:solidFill>
                 <a:latin typeface="Montserrat" panose="00000500000000000000" pitchFamily="2" charset="0"/>
               </a:rPr>
-              <a:t>Nivel de utilidades</a:t>
+              <a:t>Nivel de utilidad</a:t>
             </a:r>
           </a:p>
         </p:txBody>
@@ -7450,7 +7546,7 @@
                 </a:solidFill>
                 <a:latin typeface="Montserrat" panose="00000500000000000000" pitchFamily="2" charset="0"/>
               </a:rPr>
-              <a:t>Tasa probable de no retorno</a:t>
+              <a:t>Tasa de retorno</a:t>
             </a:r>
           </a:p>
         </p:txBody>
@@ -8905,7 +9001,7 @@
                 </a:solidFill>
                 <a:latin typeface="Montserrat" panose="00000500000000000000" pitchFamily="2" charset="0"/>
               </a:rPr>
-              <a:t>Riesgo de no retorno</a:t>
+              <a:t>Nivel de retorno</a:t>
             </a:r>
           </a:p>
         </p:txBody>

</xml_diff>